<commit_message>
* Optimize files watching * Update **PugPreProcessorSpecialist.ts** * Update **AccessibilityInspector.ts** * Update **HTML_Validator.ts** * Initialize documentation project * Update **MarkupProcessingSettingsRepresentative** * Create **MarkupEntryPointVinylFile** * Update **PartialsFilesMapper** * Create new source code watchers * Upgrade assets processors * Remove **pug-plain-loader**
</commit_message>
<xml_diff>
--- a/TemporaryDocumentation/Functionality/Shared/ResourcesPathsResolving/Drawing album.pptx
+++ b/TemporaryDocumentation/Functionality/Shared/ResourcesPathsResolving/Drawing album.pptx
@@ -244,7 +244,7 @@
           <a:p>
             <a:fld id="{0D9935A4-5BAA-46B2-B88B-91C29AAC81F9}" type="datetimeFigureOut">
               <a:rPr kumimoji="1" lang="ja-JP" altLang="en-US" smtClean="0"/>
-              <a:t>2023/2/1</a:t>
+              <a:t>2023/8/5</a:t>
             </a:fld>
             <a:endParaRPr kumimoji="1" lang="ja-JP" altLang="en-US"/>
           </a:p>
@@ -446,7 +446,7 @@
           <a:p>
             <a:fld id="{0D9935A4-5BAA-46B2-B88B-91C29AAC81F9}" type="datetimeFigureOut">
               <a:rPr kumimoji="1" lang="ja-JP" altLang="en-US" smtClean="0"/>
-              <a:t>2023/2/1</a:t>
+              <a:t>2023/8/5</a:t>
             </a:fld>
             <a:endParaRPr kumimoji="1" lang="ja-JP" altLang="en-US"/>
           </a:p>
@@ -658,7 +658,7 @@
           <a:p>
             <a:fld id="{0D9935A4-5BAA-46B2-B88B-91C29AAC81F9}" type="datetimeFigureOut">
               <a:rPr kumimoji="1" lang="ja-JP" altLang="en-US" smtClean="0"/>
-              <a:t>2023/2/1</a:t>
+              <a:t>2023/8/5</a:t>
             </a:fld>
             <a:endParaRPr kumimoji="1" lang="ja-JP" altLang="en-US"/>
           </a:p>
@@ -860,7 +860,7 @@
           <a:p>
             <a:fld id="{0D9935A4-5BAA-46B2-B88B-91C29AAC81F9}" type="datetimeFigureOut">
               <a:rPr kumimoji="1" lang="ja-JP" altLang="en-US" smtClean="0"/>
-              <a:t>2023/2/1</a:t>
+              <a:t>2023/8/5</a:t>
             </a:fld>
             <a:endParaRPr kumimoji="1" lang="ja-JP" altLang="en-US"/>
           </a:p>
@@ -1106,7 +1106,7 @@
           <a:p>
             <a:fld id="{0D9935A4-5BAA-46B2-B88B-91C29AAC81F9}" type="datetimeFigureOut">
               <a:rPr kumimoji="1" lang="ja-JP" altLang="en-US" smtClean="0"/>
-              <a:t>2023/2/1</a:t>
+              <a:t>2023/8/5</a:t>
             </a:fld>
             <a:endParaRPr kumimoji="1" lang="ja-JP" altLang="en-US"/>
           </a:p>
@@ -1402,7 +1402,7 @@
           <a:p>
             <a:fld id="{0D9935A4-5BAA-46B2-B88B-91C29AAC81F9}" type="datetimeFigureOut">
               <a:rPr kumimoji="1" lang="ja-JP" altLang="en-US" smtClean="0"/>
-              <a:t>2023/2/1</a:t>
+              <a:t>2023/8/5</a:t>
             </a:fld>
             <a:endParaRPr kumimoji="1" lang="ja-JP" altLang="en-US"/>
           </a:p>
@@ -1833,7 +1833,7 @@
           <a:p>
             <a:fld id="{0D9935A4-5BAA-46B2-B88B-91C29AAC81F9}" type="datetimeFigureOut">
               <a:rPr kumimoji="1" lang="ja-JP" altLang="en-US" smtClean="0"/>
-              <a:t>2023/2/1</a:t>
+              <a:t>2023/8/5</a:t>
             </a:fld>
             <a:endParaRPr kumimoji="1" lang="ja-JP" altLang="en-US"/>
           </a:p>
@@ -1951,7 +1951,7 @@
           <a:p>
             <a:fld id="{0D9935A4-5BAA-46B2-B88B-91C29AAC81F9}" type="datetimeFigureOut">
               <a:rPr kumimoji="1" lang="ja-JP" altLang="en-US" smtClean="0"/>
-              <a:t>2023/2/1</a:t>
+              <a:t>2023/8/5</a:t>
             </a:fld>
             <a:endParaRPr kumimoji="1" lang="ja-JP" altLang="en-US"/>
           </a:p>
@@ -2046,7 +2046,7 @@
           <a:p>
             <a:fld id="{0D9935A4-5BAA-46B2-B88B-91C29AAC81F9}" type="datetimeFigureOut">
               <a:rPr kumimoji="1" lang="ja-JP" altLang="en-US" smtClean="0"/>
-              <a:t>2023/2/1</a:t>
+              <a:t>2023/8/5</a:t>
             </a:fld>
             <a:endParaRPr kumimoji="1" lang="ja-JP" altLang="en-US"/>
           </a:p>
@@ -2355,7 +2355,7 @@
           <a:p>
             <a:fld id="{0D9935A4-5BAA-46B2-B88B-91C29AAC81F9}" type="datetimeFigureOut">
               <a:rPr kumimoji="1" lang="ja-JP" altLang="en-US" smtClean="0"/>
-              <a:t>2023/2/1</a:t>
+              <a:t>2023/8/5</a:t>
             </a:fld>
             <a:endParaRPr kumimoji="1" lang="ja-JP" altLang="en-US"/>
           </a:p>
@@ -2612,7 +2612,7 @@
           <a:p>
             <a:fld id="{0D9935A4-5BAA-46B2-B88B-91C29AAC81F9}" type="datetimeFigureOut">
               <a:rPr kumimoji="1" lang="ja-JP" altLang="en-US" smtClean="0"/>
-              <a:t>2023/2/1</a:t>
+              <a:t>2023/8/5</a:t>
             </a:fld>
             <a:endParaRPr kumimoji="1" lang="ja-JP" altLang="en-US"/>
           </a:p>
@@ -2857,7 +2857,7 @@
           <a:p>
             <a:fld id="{0D9935A4-5BAA-46B2-B88B-91C29AAC81F9}" type="datetimeFigureOut">
               <a:rPr kumimoji="1" lang="ja-JP" altLang="en-US" smtClean="0"/>
-              <a:t>2023/2/1</a:t>
+              <a:t>2023/8/5</a:t>
             </a:fld>
             <a:endParaRPr kumimoji="1" lang="ja-JP" altLang="en-US"/>
           </a:p>
@@ -3248,6 +3248,14 @@
 <file path=ppt/slides/slide1.xml><?xml version="1.0" encoding="utf-8"?>
 <p:sld xmlns:a="http://schemas.openxmlformats.org/drawingml/2006/main" xmlns:r="http://schemas.openxmlformats.org/officeDocument/2006/relationships" xmlns:p="http://schemas.openxmlformats.org/presentationml/2006/main">
   <p:cSld>
+    <p:bg>
+      <p:bgPr>
+        <a:solidFill>
+          <a:schemeClr val="tx1"/>
+        </a:solidFill>
+        <a:effectLst/>
+      </p:bgPr>
+    </p:bg>
     <p:spTree>
       <p:nvGrpSpPr>
         <p:cNvPr id="1" name=""/>
@@ -3264,10 +3272,10 @@
       </p:grpSpPr>
       <p:pic>
         <p:nvPicPr>
-          <p:cNvPr id="13" name="図 12">
+          <p:cNvPr id="3" name="図 2">
             <a:extLst>
               <a:ext uri="{FF2B5EF4-FFF2-40B4-BE49-F238E27FC236}">
-                <a16:creationId xmlns:a16="http://schemas.microsoft.com/office/drawing/2014/main" id="{6959B6A1-F4F1-ECC0-34B8-01BAE3B60E7C}"/>
+                <a16:creationId xmlns:a16="http://schemas.microsoft.com/office/drawing/2014/main" id="{F16D9681-58B3-F9D5-2833-5F649F4E72B3}"/>
               </a:ext>
             </a:extLst>
           </p:cNvPr>
@@ -3284,8 +3292,8 @@
         </p:blipFill>
         <p:spPr>
           <a:xfrm>
-            <a:off x="2018731" y="432969"/>
-            <a:ext cx="8154538" cy="5992061"/>
+            <a:off x="1002722" y="309494"/>
+            <a:ext cx="9309219" cy="6377055"/>
           </a:xfrm>
           <a:prstGeom prst="rect">
             <a:avLst/>
@@ -3306,8 +3314,8 @@
         </p:nvSpPr>
         <p:spPr>
           <a:xfrm>
-            <a:off x="5819775" y="1727200"/>
-            <a:ext cx="572365" cy="200313"/>
+            <a:off x="4779168" y="2863707"/>
+            <a:ext cx="513689" cy="181912"/>
           </a:xfrm>
           <a:prstGeom prst="rect">
             <a:avLst/>
@@ -3366,7 +3374,7 @@
         </p:nvSpPr>
         <p:spPr>
           <a:xfrm>
-            <a:off x="5262563" y="5308457"/>
+            <a:off x="4286251" y="5703949"/>
             <a:ext cx="557212" cy="228599"/>
           </a:xfrm>
           <a:prstGeom prst="rect">
@@ -3426,8 +3434,8 @@
         </p:nvSpPr>
         <p:spPr>
           <a:xfrm>
-            <a:off x="2363500" y="2733674"/>
-            <a:ext cx="1308388" cy="179389"/>
+            <a:off x="1570543" y="2343149"/>
+            <a:ext cx="567820" cy="190501"/>
           </a:xfrm>
           <a:prstGeom prst="rect">
             <a:avLst/>
@@ -3486,8 +3494,8 @@
         </p:nvSpPr>
         <p:spPr>
           <a:xfrm>
-            <a:off x="6423029" y="1727200"/>
-            <a:ext cx="829255" cy="200313"/>
+            <a:off x="5292857" y="2863708"/>
+            <a:ext cx="753137" cy="181912"/>
           </a:xfrm>
           <a:prstGeom prst="rect">
             <a:avLst/>
@@ -3546,8 +3554,8 @@
         </p:nvSpPr>
         <p:spPr>
           <a:xfrm>
-            <a:off x="7848601" y="5627544"/>
-            <a:ext cx="2043112" cy="228599"/>
+            <a:off x="6462713" y="5984731"/>
+            <a:ext cx="1790700" cy="225979"/>
           </a:xfrm>
           <a:prstGeom prst="rect">
             <a:avLst/>
@@ -3606,8 +3614,8 @@
         </p:nvSpPr>
         <p:spPr>
           <a:xfrm>
-            <a:off x="2363500" y="2963864"/>
-            <a:ext cx="1308388" cy="407986"/>
+            <a:off x="1591079" y="2555878"/>
+            <a:ext cx="1004484" cy="342103"/>
           </a:xfrm>
           <a:prstGeom prst="rect">
             <a:avLst/>
@@ -3667,9 +3675,9 @@
           <p:nvPr/>
         </p:nvCxnSpPr>
         <p:spPr>
-          <a:xfrm flipV="1">
-            <a:off x="3790072" y="1827356"/>
-            <a:ext cx="1935319" cy="947017"/>
+          <a:xfrm>
+            <a:off x="2224088" y="2438399"/>
+            <a:ext cx="2467190" cy="525465"/>
           </a:xfrm>
           <a:prstGeom prst="line">
             <a:avLst/>
@@ -3720,9 +3728,9 @@
           <p:nvPr/>
         </p:nvCxnSpPr>
         <p:spPr>
-          <a:xfrm>
-            <a:off x="3790072" y="2867891"/>
-            <a:ext cx="1384601" cy="2554865"/>
+          <a:xfrm flipH="1">
+            <a:off x="4564857" y="3159586"/>
+            <a:ext cx="471155" cy="2474520"/>
           </a:xfrm>
           <a:prstGeom prst="line">
             <a:avLst/>
@@ -3774,8 +3782,8 @@
         </p:nvCxnSpPr>
         <p:spPr>
           <a:xfrm>
-            <a:off x="5907232" y="5422756"/>
-            <a:ext cx="1844386" cy="225979"/>
+            <a:off x="4953998" y="5819558"/>
+            <a:ext cx="1337265" cy="278162"/>
           </a:xfrm>
           <a:prstGeom prst="line">
             <a:avLst/>
@@ -3826,9 +3834,9 @@
           <p:nvPr/>
         </p:nvCxnSpPr>
         <p:spPr>
-          <a:xfrm flipV="1">
-            <a:off x="3763230" y="2021031"/>
-            <a:ext cx="3074426" cy="1181989"/>
+          <a:xfrm>
+            <a:off x="2271052" y="2996399"/>
+            <a:ext cx="3196298" cy="139707"/>
           </a:xfrm>
           <a:prstGeom prst="line">
             <a:avLst/>

</xml_diff>